<commit_message>
P705-023 Comments from Clémnt
Change-Id: I88292774b9f2ae4e21404ee55c92d278a6e52fe9
</commit_message>
<xml_diff>
--- a/slides/CP_meets_Verif_2016/SPARK.pptx
+++ b/slides/CP_meets_Verif_2016/SPARK.pptx
@@ -4694,11 +4694,7 @@
             </a:r>
             <a:r>
               <a:rPr lang="fr-FR" dirty="0" smtClean="0"/>
-              <a:t> </a:t>
-            </a:r>
-            <a:r>
-              <a:rPr lang="fr-FR" dirty="0" smtClean="0"/>
-              <a:t>are essential to:</a:t>
+              <a:t> are essential to:</a:t>
             </a:r>
           </a:p>
           <a:p>
@@ -5573,11 +5569,7 @@
             </a:r>
             <a:r>
               <a:rPr lang="fr-FR" dirty="0" smtClean="0"/>
-              <a:t>) and Colibri </a:t>
-            </a:r>
-            <a:r>
-              <a:rPr lang="fr-FR" dirty="0" smtClean="0"/>
-              <a:t>(CP </a:t>
+              <a:t>) and Colibri (CP </a:t>
             </a:r>
             <a:r>
               <a:rPr lang="fr-FR" dirty="0" err="1" smtClean="0"/>
@@ -5593,11 +5585,7 @@
             </a:r>
             <a:r>
               <a:rPr lang="fr-FR" dirty="0" smtClean="0"/>
-              <a:t> </a:t>
-            </a:r>
-            <a:r>
-              <a:rPr lang="fr-FR" dirty="0" smtClean="0"/>
-              <a:t>CEA).</a:t>
+              <a:t> CEA).</a:t>
             </a:r>
           </a:p>
           <a:p>
@@ -5726,7 +5714,11 @@
             </a:pPr>
             <a:r>
               <a:rPr lang="is-IS" dirty="0" smtClean="0"/>
-              <a:t>… while preserving the good quantifier instantiation of SMT provers.</a:t>
+              <a:t>… while preserving the good quantifier instantiation of SMT provers</a:t>
+            </a:r>
+            <a:r>
+              <a:rPr lang="is-IS" dirty="0" smtClean="0"/>
+              <a:t>.</a:t>
             </a:r>
           </a:p>
           <a:p>
@@ -10504,14 +10496,14 @@
           </a:ln>
           <a:extLst>
             <a:ext uri="{909E8E84-426E-40dd-AFC4-6F175D3DCCD1}">
-              <a14:hiddenFill xmlns:a14="http://schemas.microsoft.com/office/drawing/2010/main" xmlns="">
+              <a14:hiddenFill xmlns="" xmlns:a14="http://schemas.microsoft.com/office/drawing/2010/main">
                 <a:solidFill>
                   <a:srgbClr val="FFFFFF"/>
                 </a:solidFill>
               </a14:hiddenFill>
             </a:ext>
             <a:ext uri="{91240B29-F687-4f45-9708-019B960494DF}">
-              <a14:hiddenLine xmlns:a14="http://schemas.microsoft.com/office/drawing/2010/main" xmlns="" w="9525">
+              <a14:hiddenLine xmlns="" xmlns:a14="http://schemas.microsoft.com/office/drawing/2010/main" w="9525">
                 <a:solidFill>
                   <a:srgbClr val="000000"/>
                 </a:solidFill>
@@ -12012,11 +12004,7 @@
             </a:r>
             <a:r>
               <a:rPr lang="fr-FR" dirty="0" err="1" smtClean="0"/>
-              <a:t>Pr</a:t>
-            </a:r>
-            <a:r>
-              <a:rPr lang="fr-FR" dirty="0" err="1" smtClean="0"/>
-              <a:t>overs</a:t>
+              <a:t>Provers</a:t>
             </a:r>
             <a:endParaRPr lang="fr-FR" dirty="0"/>
           </a:p>
@@ -12346,11 +12334,19 @@
             </a:r>
             <a:r>
               <a:rPr lang="fr-FR" dirty="0" err="1" smtClean="0"/>
-              <a:t>involving</a:t>
-            </a:r>
-            <a:r>
-              <a:rPr lang="fr-FR" dirty="0" smtClean="0"/>
-              <a:t> / * ** </a:t>
+              <a:t>combin</a:t>
+            </a:r>
+            <a:r>
+              <a:rPr lang="fr-FR" dirty="0" err="1" smtClean="0"/>
+              <a:t>ing</a:t>
+            </a:r>
+            <a:r>
+              <a:rPr lang="fr-FR" dirty="0" smtClean="0"/>
+              <a:t> </a:t>
+            </a:r>
+            <a:r>
+              <a:rPr lang="fr-FR" dirty="0" smtClean="0"/>
+              <a:t>/ * ** </a:t>
             </a:r>
             <a:r>
               <a:rPr lang="fr-FR" dirty="0" err="1" smtClean="0"/>
@@ -12469,15 +12465,7 @@
             </a:r>
             <a:r>
               <a:rPr lang="fr-FR" dirty="0" smtClean="0"/>
-              <a:t> by compiler</a:t>
-            </a:r>
-            <a:r>
-              <a:rPr lang="fr-FR" dirty="0" smtClean="0"/>
-              <a:t>)</a:t>
-            </a:r>
-            <a:r>
-              <a:rPr lang="fr-FR" dirty="0" smtClean="0"/>
-              <a:t> </a:t>
+              <a:t> by compiler) </a:t>
             </a:r>
             <a:r>
               <a:rPr lang="fr-FR" dirty="0" err="1" smtClean="0"/>
@@ -12535,7 +12523,6 @@
               <a:rPr lang="fr-FR" dirty="0" smtClean="0"/>
               <a:t>).</a:t>
             </a:r>
-            <a:endParaRPr lang="fr-FR" dirty="0" smtClean="0"/>
           </a:p>
           <a:p>
             <a:pPr lvl="1"/>
@@ -12902,7 +12889,12 @@
             <p:ph type="body" idx="1"/>
           </p:nvPr>
         </p:nvSpPr>
-        <p:spPr/>
+        <p:spPr>
+          <a:xfrm>
+            <a:off x="685800" y="1143000"/>
+            <a:ext cx="7990656" cy="5334000"/>
+          </a:xfrm>
+        </p:spPr>
         <p:txBody>
           <a:bodyPr/>
           <a:lstStyle/>
@@ -13292,136 +13284,42 @@
               <a:rPr lang="fr-FR" dirty="0" smtClean="0"/>
               <a:t>.</a:t>
             </a:r>
+          </a:p>
+          <a:p>
+            <a:pPr lvl="1"/>
+            <a:r>
+              <a:rPr lang="fr-FR" dirty="0" err="1" smtClean="0"/>
+              <a:t>Monotonicity</a:t>
+            </a:r>
+            <a:r>
+              <a:rPr lang="fr-FR" dirty="0" smtClean="0"/>
+              <a:t> of </a:t>
+            </a:r>
+            <a:r>
+              <a:rPr lang="fr-FR" dirty="0" err="1" smtClean="0"/>
+              <a:t>rounding</a:t>
+            </a:r>
+            <a:r>
+              <a:rPr lang="fr-FR" dirty="0" smtClean="0"/>
+              <a:t>.</a:t>
+            </a:r>
+          </a:p>
+          <a:p>
+            <a:pPr lvl="1"/>
+            <a:r>
+              <a:rPr lang="is-IS" dirty="0" smtClean="0"/>
+              <a:t>…</a:t>
+            </a:r>
             <a:endParaRPr lang="fr-FR" dirty="0" smtClean="0"/>
-          </a:p>
-          <a:p>
-            <a:pPr lvl="1"/>
-            <a:r>
-              <a:rPr lang="fr-FR" dirty="0" smtClean="0"/>
-              <a:t>Relation </a:t>
-            </a:r>
-            <a:r>
-              <a:rPr lang="fr-FR" dirty="0" err="1" smtClean="0"/>
-              <a:t>between</a:t>
-            </a:r>
-            <a:r>
-              <a:rPr lang="fr-FR" dirty="0" smtClean="0"/>
-              <a:t> </a:t>
-            </a:r>
-            <a:r>
-              <a:rPr lang="fr-FR" dirty="0" err="1" smtClean="0"/>
-              <a:t>rounding</a:t>
-            </a:r>
-            <a:r>
-              <a:rPr lang="fr-FR" dirty="0" smtClean="0"/>
-              <a:t> and </a:t>
-            </a:r>
-            <a:r>
-              <a:rPr lang="fr-FR" dirty="0" err="1" smtClean="0"/>
-              <a:t>floor</a:t>
-            </a:r>
-            <a:r>
-              <a:rPr lang="fr-FR" dirty="0" smtClean="0"/>
-              <a:t> / </a:t>
-            </a:r>
-            <a:r>
-              <a:rPr lang="fr-FR" dirty="0" err="1" smtClean="0"/>
-              <a:t>ceiling</a:t>
-            </a:r>
-            <a:r>
-              <a:rPr lang="fr-FR" dirty="0" smtClean="0"/>
-              <a:t> </a:t>
-            </a:r>
-            <a:r>
-              <a:rPr lang="fr-FR" dirty="0" err="1" smtClean="0"/>
-              <a:t>operations</a:t>
-            </a:r>
-            <a:r>
-              <a:rPr lang="fr-FR" dirty="0" smtClean="0"/>
-              <a:t>.</a:t>
-            </a:r>
-            <a:endParaRPr lang="fr-FR" dirty="0" smtClean="0"/>
-          </a:p>
-          <a:p>
-            <a:pPr lvl="1"/>
-            <a:r>
-              <a:rPr lang="fr-FR" dirty="0" err="1" smtClean="0"/>
-              <a:t>Monotonicity</a:t>
-            </a:r>
-            <a:r>
-              <a:rPr lang="fr-FR" dirty="0" smtClean="0"/>
-              <a:t> of </a:t>
-            </a:r>
-            <a:r>
-              <a:rPr lang="fr-FR" dirty="0" err="1" smtClean="0"/>
-              <a:t>rounding</a:t>
-            </a:r>
-            <a:r>
-              <a:rPr lang="fr-FR" dirty="0" smtClean="0"/>
-              <a:t>.</a:t>
-            </a:r>
-            <a:endParaRPr lang="fr-FR" dirty="0" smtClean="0"/>
-          </a:p>
-          <a:p>
-            <a:pPr lvl="1"/>
-            <a:r>
-              <a:rPr lang="fr-FR" dirty="0" err="1" smtClean="0"/>
-              <a:t>Monotonicity</a:t>
-            </a:r>
-            <a:r>
-              <a:rPr lang="fr-FR" dirty="0" smtClean="0"/>
-              <a:t> </a:t>
-            </a:r>
-            <a:r>
-              <a:rPr lang="fr-FR" dirty="0" err="1" smtClean="0"/>
-              <a:t>wrt</a:t>
-            </a:r>
-            <a:r>
-              <a:rPr lang="fr-FR" dirty="0" smtClean="0"/>
-              <a:t>. </a:t>
-            </a:r>
-            <a:r>
-              <a:rPr lang="fr-FR" dirty="0" err="1"/>
-              <a:t>i</a:t>
-            </a:r>
-            <a:r>
-              <a:rPr lang="fr-FR" dirty="0" err="1" smtClean="0"/>
-              <a:t>nteger</a:t>
-            </a:r>
-            <a:r>
-              <a:rPr lang="fr-FR" dirty="0" smtClean="0"/>
-              <a:t> </a:t>
-            </a:r>
-            <a:r>
-              <a:rPr lang="fr-FR" dirty="0" err="1" smtClean="0"/>
-              <a:t>boundaries</a:t>
-            </a:r>
-            <a:r>
-              <a:rPr lang="fr-FR" dirty="0" smtClean="0"/>
-              <a:t>.</a:t>
-            </a:r>
-            <a:endParaRPr lang="fr-FR" dirty="0" smtClean="0"/>
-          </a:p>
-          <a:p>
-            <a:pPr lvl="1"/>
-            <a:r>
-              <a:rPr lang="fr-FR" dirty="0" err="1" smtClean="0"/>
-              <a:t>Special</a:t>
-            </a:r>
-            <a:r>
-              <a:rPr lang="fr-FR" dirty="0" smtClean="0"/>
-              <a:t> first/last values of types are </a:t>
-            </a:r>
-            <a:r>
-              <a:rPr lang="fr-FR" dirty="0" smtClean="0"/>
-              <a:t>exact.</a:t>
-            </a:r>
-            <a:endParaRPr lang="fr-FR" dirty="0"/>
           </a:p>
           <a:p>
             <a:pPr marL="0" indent="0">
               <a:buNone/>
             </a:pPr>
+            <a:r>
+              <a:rPr lang="fr-FR" dirty="0" smtClean="0"/>
+              <a:t>	</a:t>
+            </a:r>
             <a:endParaRPr lang="fr-FR" dirty="0" smtClean="0"/>
           </a:p>
           <a:p>
@@ -13450,7 +13348,7 @@
             </a:r>
             <a:r>
               <a:rPr lang="fr-FR" dirty="0" smtClean="0"/>
-              <a:t> in Z3 </a:t>
+              <a:t> </a:t>
             </a:r>
             <a:r>
               <a:rPr lang="fr-FR" dirty="0" smtClean="0">
@@ -13462,7 +13360,7 @@
               <a:rPr lang="fr-FR" dirty="0" err="1" smtClean="0">
                 <a:sym typeface="Wingdings"/>
               </a:rPr>
-              <a:t>less</a:t>
+              <a:t>overall</a:t>
             </a:r>
             <a:r>
               <a:rPr lang="fr-FR" dirty="0" smtClean="0">
@@ -13474,7 +13372,109 @@
               <a:rPr lang="fr-FR" dirty="0" err="1" smtClean="0">
                 <a:sym typeface="Wingdings"/>
               </a:rPr>
+              <a:t>less</a:t>
+            </a:r>
+            <a:r>
+              <a:rPr lang="fr-FR" dirty="0" smtClean="0">
+                <a:sym typeface="Wingdings"/>
+              </a:rPr>
+              <a:t> </a:t>
+            </a:r>
+            <a:r>
+              <a:rPr lang="fr-FR" dirty="0" err="1" smtClean="0">
+                <a:sym typeface="Wingdings"/>
+              </a:rPr>
               <a:t>precise</a:t>
+            </a:r>
+            <a:endParaRPr lang="fr-FR" dirty="0" smtClean="0">
+              <a:sym typeface="Wingdings"/>
+            </a:endParaRPr>
+          </a:p>
+          <a:p>
+            <a:pPr lvl="1"/>
+            <a:r>
+              <a:rPr lang="fr-FR" dirty="0" smtClean="0"/>
+              <a:t>Z3 </a:t>
+            </a:r>
+            <a:r>
+              <a:rPr lang="fr-FR" dirty="0" err="1" smtClean="0"/>
+              <a:t>float</a:t>
+            </a:r>
+            <a:r>
+              <a:rPr lang="fr-FR" dirty="0" smtClean="0"/>
+              <a:t> support </a:t>
+            </a:r>
+            <a:r>
+              <a:rPr lang="fr-FR" dirty="0" err="1" smtClean="0"/>
+              <a:t>quite</a:t>
+            </a:r>
+            <a:r>
+              <a:rPr lang="fr-FR" dirty="0" smtClean="0"/>
+              <a:t> </a:t>
+            </a:r>
+            <a:r>
+              <a:rPr lang="fr-FR" dirty="0" err="1" smtClean="0"/>
+              <a:t>precise</a:t>
+            </a:r>
+            <a:endParaRPr lang="fr-FR" dirty="0" smtClean="0"/>
+          </a:p>
+          <a:p>
+            <a:pPr lvl="1"/>
+            <a:r>
+              <a:rPr lang="fr-FR" dirty="0" smtClean="0"/>
+              <a:t>But change </a:t>
+            </a:r>
+            <a:r>
+              <a:rPr lang="fr-FR" dirty="0" err="1" smtClean="0"/>
+              <a:t>from</a:t>
+            </a:r>
+            <a:r>
+              <a:rPr lang="fr-FR" dirty="0" smtClean="0"/>
+              <a:t> (real + </a:t>
+            </a:r>
+            <a:r>
+              <a:rPr lang="fr-FR" dirty="0" err="1" smtClean="0"/>
+              <a:t>rounding</a:t>
+            </a:r>
+            <a:r>
+              <a:rPr lang="fr-FR" dirty="0"/>
+              <a:t>)</a:t>
+            </a:r>
+            <a:r>
+              <a:rPr lang="fr-FR" dirty="0" smtClean="0"/>
+              <a:t> to (</a:t>
+            </a:r>
+            <a:r>
+              <a:rPr lang="fr-FR" dirty="0" err="1" smtClean="0"/>
+              <a:t>float</a:t>
+            </a:r>
+            <a:r>
+              <a:rPr lang="fr-FR" dirty="0" smtClean="0"/>
+              <a:t> + </a:t>
+            </a:r>
+            <a:r>
+              <a:rPr lang="fr-FR" dirty="0" err="1" smtClean="0"/>
+              <a:t>axioms</a:t>
+            </a:r>
+            <a:r>
+              <a:rPr lang="fr-FR" dirty="0" smtClean="0"/>
+              <a:t>) </a:t>
+            </a:r>
+            <a:r>
+              <a:rPr lang="fr-FR" dirty="0" err="1" smtClean="0"/>
+              <a:t>loses</a:t>
+            </a:r>
+            <a:r>
+              <a:rPr lang="fr-FR" dirty="0" smtClean="0"/>
+              <a:t> </a:t>
+            </a:r>
+            <a:r>
+              <a:rPr lang="fr-FR" dirty="0" err="1" smtClean="0"/>
+              <a:t>proofs</a:t>
+            </a:r>
+            <a:r>
+              <a:rPr lang="fr-FR" dirty="0" smtClean="0"/>
+              <a:t> for Alt-Ergo and CVC4.</a:t>
             </a:r>
             <a:endParaRPr lang="fr-FR" dirty="0" smtClean="0"/>
           </a:p>
@@ -13685,6 +13685,36 @@
               </a:rPr>
               <a:t>reals</a:t>
             </a:r>
+            <a:r>
+              <a:rPr lang="fr-FR" dirty="0" smtClean="0">
+                <a:sym typeface="Wingdings"/>
+              </a:rPr>
+              <a:t> (</a:t>
+            </a:r>
+            <a:r>
+              <a:rPr lang="fr-FR" dirty="0" err="1" smtClean="0">
+                <a:sym typeface="Wingdings"/>
+              </a:rPr>
+              <a:t>with</a:t>
+            </a:r>
+            <a:r>
+              <a:rPr lang="fr-FR" dirty="0" smtClean="0">
+                <a:sym typeface="Wingdings"/>
+              </a:rPr>
+              <a:t> </a:t>
+            </a:r>
+            <a:r>
+              <a:rPr lang="fr-FR" dirty="0" err="1" smtClean="0">
+                <a:sym typeface="Wingdings"/>
+              </a:rPr>
+              <a:t>rounding</a:t>
+            </a:r>
+            <a:r>
+              <a:rPr lang="fr-FR" dirty="0" smtClean="0">
+                <a:sym typeface="Wingdings"/>
+              </a:rPr>
+              <a:t>)</a:t>
+            </a:r>
             <a:endParaRPr lang="fr-FR" dirty="0">
               <a:sym typeface="Wingdings"/>
             </a:endParaRPr>
@@ -14111,20 +14141,28 @@
               <a:t> </a:t>
             </a:r>
             <a:r>
-              <a:rPr lang="fr-FR" dirty="0" err="1" smtClean="0"/>
-              <a:t>less</a:t>
-            </a:r>
-            <a:r>
-              <a:rPr lang="fr-FR" dirty="0" smtClean="0"/>
+              <a:rPr lang="fr-FR" dirty="0" err="1" smtClean="0">
+                <a:sym typeface="Wingdings"/>
+              </a:rPr>
+              <a:t>cannot</a:t>
+            </a:r>
+            <a:r>
+              <a:rPr lang="fr-FR" dirty="0" smtClean="0">
+                <a:sym typeface="Wingdings"/>
+              </a:rPr>
               <a:t> </a:t>
             </a:r>
             <a:r>
-              <a:rPr lang="fr-FR" dirty="0" err="1" smtClean="0"/>
-              <a:t>precise</a:t>
-            </a:r>
-            <a:r>
-              <a:rPr lang="fr-FR" dirty="0" smtClean="0"/>
-              <a:t> on </a:t>
+              <a:rPr lang="fr-FR" dirty="0" err="1" smtClean="0">
+                <a:sym typeface="Wingdings"/>
+              </a:rPr>
+              <a:t>handle</a:t>
+            </a:r>
+            <a:r>
+              <a:rPr lang="fr-FR" dirty="0" smtClean="0">
+                <a:sym typeface="Wingdings"/>
+              </a:rPr>
+              <a:t> </a:t>
             </a:r>
             <a:r>
               <a:rPr lang="fr-FR" dirty="0" err="1" smtClean="0"/>

</xml_diff>